<commit_message>
Updated scripts, plots, and a re-run of the 3 epoch model with the fix
</commit_message>
<xml_diff>
--- a/plots/3epoch_hist_growth_model.pptx
+++ b/plots/3epoch_hist_growth_model.pptx
@@ -5898,9 +5898,10 @@
             <a:p>
               <a:pPr algn="ctr"/>
               <a:r>
-                <a:rPr lang="en-US" dirty="0"/>
-                <a:t>Ts</a:t>
+                <a:rPr lang="en-US" dirty="0" err="1"/>
+                <a:t>Ti</a:t>
               </a:r>
+              <a:endParaRPr lang="en-US" dirty="0"/>
             </a:p>
           </p:txBody>
         </p:sp>

</xml_diff>